<commit_message>
Upload extraction codes, update documentation
</commit_message>
<xml_diff>
--- a/documentation/20230505 Discussion 06/Questions about Replication.pptx
+++ b/documentation/20230505 Discussion 06/Questions about Replication.pptx
@@ -3521,7 +3521,7 @@
         <p:spPr>
           <a:xfrm>
             <a:off x="7018421" y="1138990"/>
-            <a:ext cx="5111977" cy="1477328"/>
+            <a:ext cx="4860946" cy="1754326"/>
           </a:xfrm>
           <a:prstGeom prst="rect">
             <a:avLst/>
@@ -3546,7 +3546,14 @@
           <a:p>
             <a:r>
               <a:rPr lang="en-SG" dirty="0"/>
-              <a:t>It’s from another repository. I will send a zip file over.</a:t>
+              <a:t>It’s from another repository. </a:t>
+            </a:r>
+            <a:br>
+              <a:rPr lang="en-SG" dirty="0"/>
+            </a:br>
+            <a:r>
+              <a:rPr lang="en-SG" dirty="0"/>
+              <a:t>I’ve uploaded the codes under “extraction” folder.</a:t>
             </a:r>
           </a:p>
           <a:p>
@@ -3672,7 +3679,7 @@
           <a:p>
             <a:r>
               <a:rPr lang="en-SG" dirty="0"/>
-              <a:t>This script is under “Mass”, a repository to extract causal relations. I will send a zipped file of this repository over to you.</a:t>
+              <a:t>This script is under “Mass”, a repository to extract causal relations. I’ve uploaded the codes under “extraction” folder. It relies on more dependencies, see “requirements.txt”.</a:t>
             </a:r>
           </a:p>
           <a:p>
@@ -3856,7 +3863,7 @@
           <a:p>
             <a:r>
               <a:rPr lang="en-SG" dirty="0"/>
-              <a:t>Suggest you try to replicate from “mass_panasonic.py” </a:t>
+              <a:t>My suggestion is that you try to replicate from “process_extraction.py” </a:t>
             </a:r>
             <a:r>
               <a:rPr lang="en-SG" i="1" dirty="0"/>
@@ -3871,6 +3878,13 @@
             <a:pPr lvl="1"/>
             <a:r>
               <a:rPr lang="en-SG" dirty="0"/>
+              <a:t>I’ve uploaded the extracted log files under “extraction/outs.zip” for you to start from “process_extraction.py”</a:t>
+            </a:r>
+          </a:p>
+          <a:p>
+            <a:pPr lvl="1"/>
+            <a:r>
+              <a:rPr lang="en-SG" dirty="0"/>
               <a:t>If we are set on the methodology, can combine the code into one shell script.</a:t>
             </a:r>
           </a:p>
@@ -3902,12 +3916,6 @@
             <a:r>
               <a:rPr lang="en-SG" dirty="0"/>
               <a:t>” one needs to refactor</a:t>
-            </a:r>
-          </a:p>
-          <a:p>
-            <a:r>
-              <a:rPr lang="en-SG" dirty="0"/>
-              <a:t>Replication of “mass_panasonic.py” itself requires more dependencies, and possibly a GPU access</a:t>
             </a:r>
           </a:p>
         </p:txBody>

</xml_diff>